<commit_message>
one more updated lecture
</commit_message>
<xml_diff>
--- a/assets/lectures/cshl/2023/mini/RNASeq_MiniLecture_01_02_Indexing.pptx
+++ b/assets/lectures/cshl/2023/mini/RNASeq_MiniLecture_01_02_Indexing.pptx
@@ -14,7 +14,7 @@
     <p:sldId id="263" r:id="rId5"/>
     <p:sldId id="261" r:id="rId6"/>
     <p:sldId id="265" r:id="rId7"/>
-    <p:sldId id="260" r:id="rId8"/>
+    <p:sldId id="519" r:id="rId8"/>
   </p:sldIdLst>
   <p:sldSz cx="12192000" cy="6858000"/>
   <p:notesSz cx="6858000" cy="9144000"/>
@@ -203,7 +203,7 @@
           <a:p>
             <a:fld id="{827BD9F9-8452-A342-BB1B-28ECF19E2CC5}" type="datetimeFigureOut">
               <a:rPr lang="en-US" smtClean="0"/>
-              <a:t>11/5/23</a:t>
+              <a:t>11/13/23</a:t>
             </a:fld>
             <a:endParaRPr lang="en-US"/>
           </a:p>
@@ -2528,181 +2528,6 @@
               <a:defRPr/>
             </a:pPr>
             <a:endParaRPr lang="en-US" sz="1350"/>
-          </a:p>
-        </p:txBody>
-      </p:sp>
-      <p:sp>
-        <p:nvSpPr>
-          <p:cNvPr id="9" name="TextBox 8">
-            <a:extLst>
-              <a:ext uri="{FF2B5EF4-FFF2-40B4-BE49-F238E27FC236}">
-                <a16:creationId xmlns:a16="http://schemas.microsoft.com/office/drawing/2014/main" id="{3E245822-ADFF-4540-9BD4-E4A28AC54380}"/>
-              </a:ext>
-            </a:extLst>
-          </p:cNvPr>
-          <p:cNvSpPr txBox="1">
-            <a:spLocks noChangeArrowheads="1"/>
-          </p:cNvSpPr>
-          <p:nvPr userDrawn="1"/>
-        </p:nvSpPr>
-        <p:spPr bwMode="auto">
-          <a:xfrm>
-            <a:off x="111760" y="6447904"/>
-            <a:ext cx="2521392" cy="369332"/>
-          </a:xfrm>
-          <a:prstGeom prst="rect">
-            <a:avLst/>
-          </a:prstGeom>
-          <a:noFill/>
-          <a:ln>
-            <a:noFill/>
-          </a:ln>
-          <a:extLst>
-            <a:ext uri="{909E8E84-426E-40dd-AFC4-6F175D3DCCD1}">
-              <a14:hiddenFill xmlns:a14="http://schemas.microsoft.com/office/drawing/2010/main" xmlns="">
-                <a:solidFill>
-                  <a:srgbClr val="FFFFFF"/>
-                </a:solidFill>
-              </a14:hiddenFill>
-            </a:ext>
-            <a:ext uri="{91240B29-F687-4f45-9708-019B960494DF}">
-              <a14:hiddenLine xmlns:a14="http://schemas.microsoft.com/office/drawing/2010/main" xmlns="" w="9525">
-                <a:solidFill>
-                  <a:srgbClr val="000000"/>
-                </a:solidFill>
-                <a:miter lim="800000"/>
-                <a:headEnd/>
-                <a:tailEnd/>
-              </a14:hiddenLine>
-            </a:ext>
-          </a:extLst>
-        </p:spPr>
-        <p:txBody>
-          <a:bodyPr wrap="square">
-            <a:spAutoFit/>
-          </a:bodyPr>
-          <a:lstStyle>
-            <a:lvl1pPr eaLnBrk="0" hangingPunct="0">
-              <a:defRPr sz="2400">
-                <a:solidFill>
-                  <a:schemeClr val="tx1"/>
-                </a:solidFill>
-                <a:latin typeface="Arial" charset="0"/>
-                <a:ea typeface="ＭＳ Ｐゴシック" charset="0"/>
-                <a:cs typeface="ＭＳ Ｐゴシック" charset="0"/>
-              </a:defRPr>
-            </a:lvl1pPr>
-            <a:lvl2pPr marL="742950" indent="-285750" eaLnBrk="0" hangingPunct="0">
-              <a:defRPr sz="2400">
-                <a:solidFill>
-                  <a:schemeClr val="tx1"/>
-                </a:solidFill>
-                <a:latin typeface="Arial" charset="0"/>
-                <a:ea typeface="ＭＳ Ｐゴシック" charset="0"/>
-              </a:defRPr>
-            </a:lvl2pPr>
-            <a:lvl3pPr marL="1143000" indent="-228600" eaLnBrk="0" hangingPunct="0">
-              <a:defRPr sz="2400">
-                <a:solidFill>
-                  <a:schemeClr val="tx1"/>
-                </a:solidFill>
-                <a:latin typeface="Arial" charset="0"/>
-                <a:ea typeface="ＭＳ Ｐゴシック" charset="0"/>
-              </a:defRPr>
-            </a:lvl3pPr>
-            <a:lvl4pPr marL="1600200" indent="-228600" eaLnBrk="0" hangingPunct="0">
-              <a:defRPr sz="2400">
-                <a:solidFill>
-                  <a:schemeClr val="tx1"/>
-                </a:solidFill>
-                <a:latin typeface="Arial" charset="0"/>
-                <a:ea typeface="ＭＳ Ｐゴシック" charset="0"/>
-              </a:defRPr>
-            </a:lvl4pPr>
-            <a:lvl5pPr marL="2057400" indent="-228600" eaLnBrk="0" hangingPunct="0">
-              <a:defRPr sz="2400">
-                <a:solidFill>
-                  <a:schemeClr val="tx1"/>
-                </a:solidFill>
-                <a:latin typeface="Arial" charset="0"/>
-                <a:ea typeface="ＭＳ Ｐゴシック" charset="0"/>
-              </a:defRPr>
-            </a:lvl5pPr>
-            <a:lvl6pPr marL="2514600" indent="-228600" eaLnBrk="0" fontAlgn="base" hangingPunct="0">
-              <a:spcBef>
-                <a:spcPct val="0"/>
-              </a:spcBef>
-              <a:spcAft>
-                <a:spcPct val="0"/>
-              </a:spcAft>
-              <a:defRPr sz="2400">
-                <a:solidFill>
-                  <a:schemeClr val="tx1"/>
-                </a:solidFill>
-                <a:latin typeface="Arial" charset="0"/>
-                <a:ea typeface="ＭＳ Ｐゴシック" charset="0"/>
-              </a:defRPr>
-            </a:lvl6pPr>
-            <a:lvl7pPr marL="2971800" indent="-228600" eaLnBrk="0" fontAlgn="base" hangingPunct="0">
-              <a:spcBef>
-                <a:spcPct val="0"/>
-              </a:spcBef>
-              <a:spcAft>
-                <a:spcPct val="0"/>
-              </a:spcAft>
-              <a:defRPr sz="2400">
-                <a:solidFill>
-                  <a:schemeClr val="tx1"/>
-                </a:solidFill>
-                <a:latin typeface="Arial" charset="0"/>
-                <a:ea typeface="ＭＳ Ｐゴシック" charset="0"/>
-              </a:defRPr>
-            </a:lvl7pPr>
-            <a:lvl8pPr marL="3429000" indent="-228600" eaLnBrk="0" fontAlgn="base" hangingPunct="0">
-              <a:spcBef>
-                <a:spcPct val="0"/>
-              </a:spcBef>
-              <a:spcAft>
-                <a:spcPct val="0"/>
-              </a:spcAft>
-              <a:defRPr sz="2400">
-                <a:solidFill>
-                  <a:schemeClr val="tx1"/>
-                </a:solidFill>
-                <a:latin typeface="Arial" charset="0"/>
-                <a:ea typeface="ＭＳ Ｐゴシック" charset="0"/>
-              </a:defRPr>
-            </a:lvl8pPr>
-            <a:lvl9pPr marL="3886200" indent="-228600" eaLnBrk="0" fontAlgn="base" hangingPunct="0">
-              <a:spcBef>
-                <a:spcPct val="0"/>
-              </a:spcBef>
-              <a:spcAft>
-                <a:spcPct val="0"/>
-              </a:spcAft>
-              <a:defRPr sz="2400">
-                <a:solidFill>
-                  <a:schemeClr val="tx1"/>
-                </a:solidFill>
-                <a:latin typeface="Arial" charset="0"/>
-                <a:ea typeface="ＭＳ Ｐゴシック" charset="0"/>
-              </a:defRPr>
-            </a:lvl9pPr>
-          </a:lstStyle>
-          <a:p>
-            <a:pPr eaLnBrk="1" hangingPunct="1">
-              <a:defRPr/>
-            </a:pPr>
-            <a:r>
-              <a:rPr lang="en-US" sz="1800" b="1" dirty="0">
-                <a:solidFill>
-                  <a:schemeClr val="bg1"/>
-                </a:solidFill>
-                <a:latin typeface="Calibri" charset="0"/>
-                <a:cs typeface="Calibri" charset="0"/>
-              </a:rPr>
-              <a:t>Module 1 </a:t>
-            </a:r>
           </a:p>
         </p:txBody>
       </p:sp>
@@ -3440,14 +3265,14 @@
           </a:ln>
           <a:extLst>
             <a:ext uri="{909E8E84-426E-40dd-AFC4-6F175D3DCCD1}">
-              <a14:hiddenFill xmlns="" xmlns:a14="http://schemas.microsoft.com/office/drawing/2010/main">
+              <a14:hiddenFill xmlns:a14="http://schemas.microsoft.com/office/drawing/2010/main" xmlns="">
                 <a:solidFill>
                   <a:srgbClr val="FFFFFF"/>
                 </a:solidFill>
               </a14:hiddenFill>
             </a:ext>
             <a:ext uri="{91240B29-F687-4f45-9708-019B960494DF}">
-              <a14:hiddenLine xmlns="" xmlns:a14="http://schemas.microsoft.com/office/drawing/2010/main" w="9525">
+              <a14:hiddenLine xmlns:a14="http://schemas.microsoft.com/office/drawing/2010/main" xmlns="" w="9525">
                 <a:solidFill>
                   <a:srgbClr val="000000"/>
                 </a:solidFill>
@@ -5274,7 +5099,7 @@
     </p:spTree>
     <p:extLst>
       <p:ext uri="{BB962C8B-B14F-4D97-AF65-F5344CB8AC3E}">
-        <p14:creationId xmlns:p14="http://schemas.microsoft.com/office/powerpoint/2010/main" val="3238349181"/>
+        <p14:creationId xmlns:p14="http://schemas.microsoft.com/office/powerpoint/2010/main" val="3977104089"/>
       </p:ext>
     </p:extLst>
   </p:cSld>
@@ -5539,7 +5364,7 @@
   <a:extraClrSchemeLst/>
   <a:extLst>
     <a:ext uri="{05A4C25C-085E-4340-85A3-A5531E510DB2}">
-      <thm15:themeFamily xmlns:thm15="http://schemas.microsoft.com/office/thememl/2012/main" name="Presentation3" id="{BCBDB91A-9B26-824C-84F1-38A40AE60A56}" vid="{D4184701-6EB9-C840-884B-4BABDB359DA6}"/>
+      <thm15:themeFamily xmlns:thm15="http://schemas.microsoft.com/office/thememl/2012/main" name="RNAseq_2023_Template_Widescreen_CSHL_update" id="{2B2B3122-3A88-4743-9DB2-446FE2FBC4EE}" vid="{F93A8BE4-D41B-7440-AED2-16AC3B131A7C}"/>
     </a:ext>
   </a:extLst>
 </a:theme>

</xml_diff>